<commit_message>
images for the comparison are there
</commit_message>
<xml_diff>
--- a/schemaDessin.pptx
+++ b/schemaDessin.pptx
@@ -7,6 +7,12 @@
   <p:sldIdLst>
     <p:sldId id="256" r:id="rId2"/>
     <p:sldId id="257" r:id="rId3"/>
+    <p:sldId id="258" r:id="rId4"/>
+    <p:sldId id="259" r:id="rId5"/>
+    <p:sldId id="260" r:id="rId6"/>
+    <p:sldId id="261" r:id="rId7"/>
+    <p:sldId id="262" r:id="rId8"/>
+    <p:sldId id="263" r:id="rId9"/>
   </p:sldIdLst>
   <p:sldSz cx="12192000" cy="6858000"/>
   <p:notesSz cx="6858000" cy="9144000"/>
@@ -105,6 +111,11 @@
       </a:defRPr>
     </a:lvl9pPr>
   </p:defaultTextStyle>
+  <p:extLst>
+    <p:ext uri="{EFAFB233-063F-42B5-8137-9DF3F51BA10A}">
+      <p15:sldGuideLst xmlns:p15="http://schemas.microsoft.com/office/powerpoint/2012/main"/>
+    </p:ext>
+  </p:extLst>
 </p:presentation>
 </file>
 
@@ -3825,6 +3836,396 @@
 </p:sld>
 </file>
 
+<file path=ppt/slides/slide3.xml><?xml version="1.0" encoding="utf-8"?>
+<p:sld xmlns:a="http://schemas.openxmlformats.org/drawingml/2006/main" xmlns:r="http://schemas.openxmlformats.org/officeDocument/2006/relationships" xmlns:p="http://schemas.openxmlformats.org/presentationml/2006/main">
+  <p:cSld>
+    <p:spTree>
+      <p:nvGrpSpPr>
+        <p:cNvPr id="1" name=""/>
+        <p:cNvGrpSpPr/>
+        <p:nvPr/>
+      </p:nvGrpSpPr>
+      <p:grpSpPr>
+        <a:xfrm>
+          <a:off x="0" y="0"/>
+          <a:ext cx="0" cy="0"/>
+          <a:chOff x="0" y="0"/>
+          <a:chExt cx="0" cy="0"/>
+        </a:xfrm>
+      </p:grpSpPr>
+      <p:pic>
+        <p:nvPicPr>
+          <p:cNvPr id="3" name="Picture 2">
+            <a:extLst>
+              <a:ext uri="{FF2B5EF4-FFF2-40B4-BE49-F238E27FC236}">
+                <a16:creationId xmlns:a16="http://schemas.microsoft.com/office/drawing/2014/main" id="{35B41DDE-9BE8-4DD6-AC10-6E89A0DE8DD3}"/>
+              </a:ext>
+            </a:extLst>
+          </p:cNvPr>
+          <p:cNvPicPr>
+            <a:picLocks noChangeAspect="1"/>
+          </p:cNvPicPr>
+          <p:nvPr/>
+        </p:nvPicPr>
+        <p:blipFill rotWithShape="1">
+          <a:blip r:embed="rId2">
+            <a:extLst>
+              <a:ext uri="{28A0092B-C50C-407E-A947-70E740481C1C}">
+                <a14:useLocalDpi xmlns:a14="http://schemas.microsoft.com/office/drawing/2010/main" val="0"/>
+              </a:ext>
+            </a:extLst>
+          </a:blip>
+          <a:srcRect l="8295" r="16616"/>
+          <a:stretch/>
+        </p:blipFill>
+        <p:spPr>
+          <a:xfrm>
+            <a:off x="491586" y="3047"/>
+            <a:ext cx="3420000" cy="3414658"/>
+          </a:xfrm>
+          <a:prstGeom prst="rect">
+            <a:avLst/>
+          </a:prstGeom>
+        </p:spPr>
+      </p:pic>
+      <p:pic>
+        <p:nvPicPr>
+          <p:cNvPr id="5" name="Picture 4">
+            <a:extLst>
+              <a:ext uri="{FF2B5EF4-FFF2-40B4-BE49-F238E27FC236}">
+                <a16:creationId xmlns:a16="http://schemas.microsoft.com/office/drawing/2014/main" id="{4FB717CF-5A5E-4689-91F8-C44D30CBA659}"/>
+              </a:ext>
+            </a:extLst>
+          </p:cNvPr>
+          <p:cNvPicPr>
+            <a:picLocks noChangeAspect="1"/>
+          </p:cNvPicPr>
+          <p:nvPr/>
+        </p:nvPicPr>
+        <p:blipFill rotWithShape="1">
+          <a:blip r:embed="rId3">
+            <a:extLst>
+              <a:ext uri="{28A0092B-C50C-407E-A947-70E740481C1C}">
+                <a14:useLocalDpi xmlns:a14="http://schemas.microsoft.com/office/drawing/2010/main" val="0"/>
+              </a:ext>
+            </a:extLst>
+          </a:blip>
+          <a:srcRect l="8454" r="16616"/>
+          <a:stretch/>
+        </p:blipFill>
+        <p:spPr>
+          <a:xfrm>
+            <a:off x="3959782" y="0"/>
+            <a:ext cx="3420000" cy="3421891"/>
+          </a:xfrm>
+          <a:prstGeom prst="rect">
+            <a:avLst/>
+          </a:prstGeom>
+        </p:spPr>
+      </p:pic>
+      <p:pic>
+        <p:nvPicPr>
+          <p:cNvPr id="7" name="Picture 6">
+            <a:extLst>
+              <a:ext uri="{FF2B5EF4-FFF2-40B4-BE49-F238E27FC236}">
+                <a16:creationId xmlns:a16="http://schemas.microsoft.com/office/drawing/2014/main" id="{3A36E399-9CEF-4ED4-948A-8A4ACB1D16C9}"/>
+              </a:ext>
+            </a:extLst>
+          </p:cNvPr>
+          <p:cNvPicPr>
+            <a:picLocks noChangeAspect="1"/>
+          </p:cNvPicPr>
+          <p:nvPr/>
+        </p:nvPicPr>
+        <p:blipFill rotWithShape="1">
+          <a:blip r:embed="rId4">
+            <a:extLst>
+              <a:ext uri="{28A0092B-C50C-407E-A947-70E740481C1C}">
+                <a14:useLocalDpi xmlns:a14="http://schemas.microsoft.com/office/drawing/2010/main" val="0"/>
+              </a:ext>
+            </a:extLst>
+          </a:blip>
+          <a:srcRect l="9089" r="15822"/>
+          <a:stretch/>
+        </p:blipFill>
+        <p:spPr>
+          <a:xfrm>
+            <a:off x="7427978" y="3047"/>
+            <a:ext cx="3420000" cy="3414658"/>
+          </a:xfrm>
+          <a:prstGeom prst="rect">
+            <a:avLst/>
+          </a:prstGeom>
+        </p:spPr>
+      </p:pic>
+      <p:pic>
+        <p:nvPicPr>
+          <p:cNvPr id="9" name="Picture 8">
+            <a:extLst>
+              <a:ext uri="{FF2B5EF4-FFF2-40B4-BE49-F238E27FC236}">
+                <a16:creationId xmlns:a16="http://schemas.microsoft.com/office/drawing/2014/main" id="{4E6A4B84-BE5D-4B2A-90AC-A8BB913A86EE}"/>
+              </a:ext>
+            </a:extLst>
+          </p:cNvPr>
+          <p:cNvPicPr>
+            <a:picLocks noChangeAspect="1"/>
+          </p:cNvPicPr>
+          <p:nvPr/>
+        </p:nvPicPr>
+        <p:blipFill rotWithShape="1">
+          <a:blip r:embed="rId5">
+            <a:extLst>
+              <a:ext uri="{28A0092B-C50C-407E-A947-70E740481C1C}">
+                <a14:useLocalDpi xmlns:a14="http://schemas.microsoft.com/office/drawing/2010/main" val="0"/>
+              </a:ext>
+            </a:extLst>
+          </a:blip>
+          <a:srcRect l="9089" r="15980"/>
+          <a:stretch/>
+        </p:blipFill>
+        <p:spPr>
+          <a:xfrm>
+            <a:off x="491586" y="3458792"/>
+            <a:ext cx="3420000" cy="3421891"/>
+          </a:xfrm>
+          <a:prstGeom prst="rect">
+            <a:avLst/>
+          </a:prstGeom>
+        </p:spPr>
+      </p:pic>
+      <p:pic>
+        <p:nvPicPr>
+          <p:cNvPr id="11" name="Picture 10">
+            <a:extLst>
+              <a:ext uri="{FF2B5EF4-FFF2-40B4-BE49-F238E27FC236}">
+                <a16:creationId xmlns:a16="http://schemas.microsoft.com/office/drawing/2014/main" id="{6162951A-36AD-4488-87CE-5654A40B9E9E}"/>
+              </a:ext>
+            </a:extLst>
+          </p:cNvPr>
+          <p:cNvPicPr>
+            <a:picLocks noChangeAspect="1"/>
+          </p:cNvPicPr>
+          <p:nvPr/>
+        </p:nvPicPr>
+        <p:blipFill rotWithShape="1">
+          <a:blip r:embed="rId6">
+            <a:extLst>
+              <a:ext uri="{28A0092B-C50C-407E-A947-70E740481C1C}">
+                <a14:useLocalDpi xmlns:a14="http://schemas.microsoft.com/office/drawing/2010/main" val="0"/>
+              </a:ext>
+            </a:extLst>
+          </a:blip>
+          <a:srcRect l="9883" r="15187"/>
+          <a:stretch/>
+        </p:blipFill>
+        <p:spPr>
+          <a:xfrm>
+            <a:off x="3959781" y="3458792"/>
+            <a:ext cx="3420000" cy="3421891"/>
+          </a:xfrm>
+          <a:prstGeom prst="rect">
+            <a:avLst/>
+          </a:prstGeom>
+        </p:spPr>
+      </p:pic>
+      <p:pic>
+        <p:nvPicPr>
+          <p:cNvPr id="13" name="Picture 12">
+            <a:extLst>
+              <a:ext uri="{FF2B5EF4-FFF2-40B4-BE49-F238E27FC236}">
+                <a16:creationId xmlns:a16="http://schemas.microsoft.com/office/drawing/2014/main" id="{3CD109CC-4416-47B7-989B-F43921A60B78}"/>
+              </a:ext>
+            </a:extLst>
+          </p:cNvPr>
+          <p:cNvPicPr>
+            <a:picLocks noChangeAspect="1"/>
+          </p:cNvPicPr>
+          <p:nvPr/>
+        </p:nvPicPr>
+        <p:blipFill rotWithShape="1">
+          <a:blip r:embed="rId7">
+            <a:extLst>
+              <a:ext uri="{28A0092B-C50C-407E-A947-70E740481C1C}">
+                <a14:useLocalDpi xmlns:a14="http://schemas.microsoft.com/office/drawing/2010/main" val="0"/>
+              </a:ext>
+            </a:extLst>
+          </a:blip>
+          <a:srcRect l="9406" r="15664"/>
+          <a:stretch/>
+        </p:blipFill>
+        <p:spPr>
+          <a:xfrm>
+            <a:off x="7427976" y="3458792"/>
+            <a:ext cx="3420000" cy="3421891"/>
+          </a:xfrm>
+          <a:prstGeom prst="rect">
+            <a:avLst/>
+          </a:prstGeom>
+        </p:spPr>
+      </p:pic>
+    </p:spTree>
+    <p:extLst>
+      <p:ext uri="{BB962C8B-B14F-4D97-AF65-F5344CB8AC3E}">
+        <p14:creationId xmlns:p14="http://schemas.microsoft.com/office/powerpoint/2010/main" val="3649266"/>
+      </p:ext>
+    </p:extLst>
+  </p:cSld>
+  <p:clrMapOvr>
+    <a:masterClrMapping/>
+  </p:clrMapOvr>
+</p:sld>
+</file>
+
+<file path=ppt/slides/slide4.xml><?xml version="1.0" encoding="utf-8"?>
+<p:sld xmlns:a="http://schemas.openxmlformats.org/drawingml/2006/main" xmlns:r="http://schemas.openxmlformats.org/officeDocument/2006/relationships" xmlns:p="http://schemas.openxmlformats.org/presentationml/2006/main">
+  <p:cSld>
+    <p:spTree>
+      <p:nvGrpSpPr>
+        <p:cNvPr id="1" name=""/>
+        <p:cNvGrpSpPr/>
+        <p:nvPr/>
+      </p:nvGrpSpPr>
+      <p:grpSpPr>
+        <a:xfrm>
+          <a:off x="0" y="0"/>
+          <a:ext cx="0" cy="0"/>
+          <a:chOff x="0" y="0"/>
+          <a:chExt cx="0" cy="0"/>
+        </a:xfrm>
+      </p:grpSpPr>
+    </p:spTree>
+    <p:extLst>
+      <p:ext uri="{BB962C8B-B14F-4D97-AF65-F5344CB8AC3E}">
+        <p14:creationId xmlns:p14="http://schemas.microsoft.com/office/powerpoint/2010/main" val="1512190080"/>
+      </p:ext>
+    </p:extLst>
+  </p:cSld>
+  <p:clrMapOvr>
+    <a:masterClrMapping/>
+  </p:clrMapOvr>
+</p:sld>
+</file>
+
+<file path=ppt/slides/slide5.xml><?xml version="1.0" encoding="utf-8"?>
+<p:sld xmlns:a="http://schemas.openxmlformats.org/drawingml/2006/main" xmlns:r="http://schemas.openxmlformats.org/officeDocument/2006/relationships" xmlns:p="http://schemas.openxmlformats.org/presentationml/2006/main">
+  <p:cSld>
+    <p:spTree>
+      <p:nvGrpSpPr>
+        <p:cNvPr id="1" name=""/>
+        <p:cNvGrpSpPr/>
+        <p:nvPr/>
+      </p:nvGrpSpPr>
+      <p:grpSpPr>
+        <a:xfrm>
+          <a:off x="0" y="0"/>
+          <a:ext cx="0" cy="0"/>
+          <a:chOff x="0" y="0"/>
+          <a:chExt cx="0" cy="0"/>
+        </a:xfrm>
+      </p:grpSpPr>
+    </p:spTree>
+    <p:extLst>
+      <p:ext uri="{BB962C8B-B14F-4D97-AF65-F5344CB8AC3E}">
+        <p14:creationId xmlns:p14="http://schemas.microsoft.com/office/powerpoint/2010/main" val="2397439997"/>
+      </p:ext>
+    </p:extLst>
+  </p:cSld>
+  <p:clrMapOvr>
+    <a:masterClrMapping/>
+  </p:clrMapOvr>
+</p:sld>
+</file>
+
+<file path=ppt/slides/slide6.xml><?xml version="1.0" encoding="utf-8"?>
+<p:sld xmlns:a="http://schemas.openxmlformats.org/drawingml/2006/main" xmlns:r="http://schemas.openxmlformats.org/officeDocument/2006/relationships" xmlns:p="http://schemas.openxmlformats.org/presentationml/2006/main">
+  <p:cSld>
+    <p:spTree>
+      <p:nvGrpSpPr>
+        <p:cNvPr id="1" name=""/>
+        <p:cNvGrpSpPr/>
+        <p:nvPr/>
+      </p:nvGrpSpPr>
+      <p:grpSpPr>
+        <a:xfrm>
+          <a:off x="0" y="0"/>
+          <a:ext cx="0" cy="0"/>
+          <a:chOff x="0" y="0"/>
+          <a:chExt cx="0" cy="0"/>
+        </a:xfrm>
+      </p:grpSpPr>
+    </p:spTree>
+    <p:extLst>
+      <p:ext uri="{BB962C8B-B14F-4D97-AF65-F5344CB8AC3E}">
+        <p14:creationId xmlns:p14="http://schemas.microsoft.com/office/powerpoint/2010/main" val="1790875932"/>
+      </p:ext>
+    </p:extLst>
+  </p:cSld>
+  <p:clrMapOvr>
+    <a:masterClrMapping/>
+  </p:clrMapOvr>
+</p:sld>
+</file>
+
+<file path=ppt/slides/slide7.xml><?xml version="1.0" encoding="utf-8"?>
+<p:sld xmlns:a="http://schemas.openxmlformats.org/drawingml/2006/main" xmlns:r="http://schemas.openxmlformats.org/officeDocument/2006/relationships" xmlns:p="http://schemas.openxmlformats.org/presentationml/2006/main">
+  <p:cSld>
+    <p:spTree>
+      <p:nvGrpSpPr>
+        <p:cNvPr id="1" name=""/>
+        <p:cNvGrpSpPr/>
+        <p:nvPr/>
+      </p:nvGrpSpPr>
+      <p:grpSpPr>
+        <a:xfrm>
+          <a:off x="0" y="0"/>
+          <a:ext cx="0" cy="0"/>
+          <a:chOff x="0" y="0"/>
+          <a:chExt cx="0" cy="0"/>
+        </a:xfrm>
+      </p:grpSpPr>
+    </p:spTree>
+    <p:extLst>
+      <p:ext uri="{BB962C8B-B14F-4D97-AF65-F5344CB8AC3E}">
+        <p14:creationId xmlns:p14="http://schemas.microsoft.com/office/powerpoint/2010/main" val="1180769911"/>
+      </p:ext>
+    </p:extLst>
+  </p:cSld>
+  <p:clrMapOvr>
+    <a:masterClrMapping/>
+  </p:clrMapOvr>
+</p:sld>
+</file>
+
+<file path=ppt/slides/slide8.xml><?xml version="1.0" encoding="utf-8"?>
+<p:sld xmlns:a="http://schemas.openxmlformats.org/drawingml/2006/main" xmlns:r="http://schemas.openxmlformats.org/officeDocument/2006/relationships" xmlns:p="http://schemas.openxmlformats.org/presentationml/2006/main">
+  <p:cSld>
+    <p:spTree>
+      <p:nvGrpSpPr>
+        <p:cNvPr id="1" name=""/>
+        <p:cNvGrpSpPr/>
+        <p:nvPr/>
+      </p:nvGrpSpPr>
+      <p:grpSpPr>
+        <a:xfrm>
+          <a:off x="0" y="0"/>
+          <a:ext cx="0" cy="0"/>
+          <a:chOff x="0" y="0"/>
+          <a:chExt cx="0" cy="0"/>
+        </a:xfrm>
+      </p:grpSpPr>
+    </p:spTree>
+    <p:extLst>
+      <p:ext uri="{BB962C8B-B14F-4D97-AF65-F5344CB8AC3E}">
+        <p14:creationId xmlns:p14="http://schemas.microsoft.com/office/powerpoint/2010/main" val="52447716"/>
+      </p:ext>
+    </p:extLst>
+  </p:cSld>
+  <p:clrMapOvr>
+    <a:masterClrMapping/>
+  </p:clrMapOvr>
+</p:sld>
+</file>
+
 <file path=ppt/theme/theme1.xml><?xml version="1.0" encoding="utf-8"?>
 <a:theme xmlns:a="http://schemas.openxmlformats.org/drawingml/2006/main" name="Office Theme">
   <a:themeElements>

</xml_diff>